<commit_message>
added final presentation v2
</commit_message>
<xml_diff>
--- a/doc/final_presentation/semantic_web_final_presentation.pptx
+++ b/doc/final_presentation/semantic_web_final_presentation.pptx
@@ -5,7 +5,7 @@
     <p:sldMasterId id="2147483659" r:id="rId1"/>
   </p:sldMasterIdLst>
   <p:notesMasterIdLst>
-    <p:notesMasterId r:id="rId21"/>
+    <p:notesMasterId r:id="rId20"/>
   </p:notesMasterIdLst>
   <p:sldIdLst>
     <p:sldId id="256" r:id="rId2"/>
@@ -26,24 +26,23 @@
     <p:sldId id="297" r:id="rId17"/>
     <p:sldId id="293" r:id="rId18"/>
     <p:sldId id="294" r:id="rId19"/>
-    <p:sldId id="296" r:id="rId20"/>
   </p:sldIdLst>
   <p:sldSz cx="12192000" cy="6858000"/>
   <p:notesSz cx="6858000" cy="9144000"/>
   <p:embeddedFontLst>
     <p:embeddedFont>
       <p:font typeface="Calibri" panose="020F0502020204030204" pitchFamily="34" charset="0"/>
-      <p:regular r:id="rId22"/>
-      <p:bold r:id="rId23"/>
-      <p:italic r:id="rId24"/>
-      <p:boldItalic r:id="rId25"/>
+      <p:regular r:id="rId21"/>
+      <p:bold r:id="rId22"/>
+      <p:italic r:id="rId23"/>
+      <p:boldItalic r:id="rId24"/>
     </p:embeddedFont>
     <p:embeddedFont>
       <p:font typeface="Roboto Mono" panose="020B0604020202020204" charset="0"/>
-      <p:regular r:id="rId26"/>
-      <p:bold r:id="rId27"/>
-      <p:italic r:id="rId28"/>
-      <p:boldItalic r:id="rId29"/>
+      <p:regular r:id="rId25"/>
+      <p:bold r:id="rId26"/>
+      <p:italic r:id="rId27"/>
+      <p:boldItalic r:id="rId28"/>
     </p:embeddedFont>
   </p:embeddedFontLst>
   <p:defaultTextStyle>
@@ -1808,115 +1807,6 @@
     <p:extLst>
       <p:ext uri="{BB962C8B-B14F-4D97-AF65-F5344CB8AC3E}">
         <p14:creationId xmlns:p14="http://schemas.microsoft.com/office/powerpoint/2010/main" val="1509540085"/>
-      </p:ext>
-    </p:extLst>
-  </p:cSld>
-  <p:clrMapOvr>
-    <a:masterClrMapping/>
-  </p:clrMapOvr>
-</p:notes>
-</file>
-
-<file path=ppt/notesSlides/notesSlide19.xml><?xml version="1.0" encoding="utf-8"?>
-<p:notes xmlns:a="http://schemas.openxmlformats.org/drawingml/2006/main" xmlns:r="http://schemas.openxmlformats.org/officeDocument/2006/relationships" xmlns:p="http://schemas.openxmlformats.org/presentationml/2006/main" showMasterSp="0" showMasterPhAnim="0">
-  <p:cSld>
-    <p:spTree>
-      <p:nvGrpSpPr>
-        <p:cNvPr id="1" name="Shape 92"/>
-        <p:cNvGrpSpPr/>
-        <p:nvPr/>
-      </p:nvGrpSpPr>
-      <p:grpSpPr>
-        <a:xfrm>
-          <a:off x="0" y="0"/>
-          <a:ext cx="0" cy="0"/>
-          <a:chOff x="0" y="0"/>
-          <a:chExt cx="0" cy="0"/>
-        </a:xfrm>
-      </p:grpSpPr>
-      <p:sp>
-        <p:nvSpPr>
-          <p:cNvPr id="93" name="Google Shape;93;p3:notes"/>
-          <p:cNvSpPr txBox="1">
-            <a:spLocks noGrp="1"/>
-          </p:cNvSpPr>
-          <p:nvPr>
-            <p:ph type="body" idx="1"/>
-          </p:nvPr>
-        </p:nvSpPr>
-        <p:spPr>
-          <a:xfrm>
-            <a:off x="685800" y="4343400"/>
-            <a:ext cx="5486400" cy="4114800"/>
-          </a:xfrm>
-          <a:prstGeom prst="rect">
-            <a:avLst/>
-          </a:prstGeom>
-        </p:spPr>
-        <p:txBody>
-          <a:bodyPr spcFirstLastPara="1" wrap="square" lIns="91425" tIns="91425" rIns="91425" bIns="91425" anchor="t" anchorCtr="0">
-            <a:noAutofit/>
-          </a:bodyPr>
-          <a:lstStyle/>
-          <a:p>
-            <a:pPr marL="0" lvl="0" indent="0" algn="l" rtl="0">
-              <a:spcBef>
-                <a:spcPts val="0"/>
-              </a:spcBef>
-              <a:spcAft>
-                <a:spcPts val="0"/>
-              </a:spcAft>
-              <a:buNone/>
-            </a:pPr>
-            <a:endParaRPr/>
-          </a:p>
-        </p:txBody>
-      </p:sp>
-      <p:sp>
-        <p:nvSpPr>
-          <p:cNvPr id="94" name="Google Shape;94;p3:notes"/>
-          <p:cNvSpPr>
-            <a:spLocks noGrp="1" noRot="1" noChangeAspect="1"/>
-          </p:cNvSpPr>
-          <p:nvPr>
-            <p:ph type="sldImg" idx="2"/>
-          </p:nvPr>
-        </p:nvSpPr>
-        <p:spPr>
-          <a:xfrm>
-            <a:off x="381000" y="685800"/>
-            <a:ext cx="6096000" cy="3429000"/>
-          </a:xfrm>
-          <a:custGeom>
-            <a:avLst/>
-            <a:gdLst/>
-            <a:ahLst/>
-            <a:cxnLst/>
-            <a:rect l="l" t="t" r="r" b="b"/>
-            <a:pathLst>
-              <a:path w="120000" h="120000" extrusionOk="0">
-                <a:moveTo>
-                  <a:pt x="0" y="0"/>
-                </a:moveTo>
-                <a:lnTo>
-                  <a:pt x="120000" y="0"/>
-                </a:lnTo>
-                <a:lnTo>
-                  <a:pt x="120000" y="120000"/>
-                </a:lnTo>
-                <a:lnTo>
-                  <a:pt x="0" y="120000"/>
-                </a:lnTo>
-                <a:close/>
-              </a:path>
-            </a:pathLst>
-          </a:custGeom>
-        </p:spPr>
-      </p:sp>
-    </p:spTree>
-    <p:extLst>
-      <p:ext uri="{BB962C8B-B14F-4D97-AF65-F5344CB8AC3E}">
-        <p14:creationId xmlns:p14="http://schemas.microsoft.com/office/powerpoint/2010/main" val="2432100921"/>
       </p:ext>
     </p:extLst>
   </p:cSld>
@@ -15937,167 +15827,6 @@
 </p:sld>
 </file>
 
-<file path=ppt/slides/slide19.xml><?xml version="1.0" encoding="utf-8"?>
-<p:sld xmlns:a="http://schemas.openxmlformats.org/drawingml/2006/main" xmlns:r="http://schemas.openxmlformats.org/officeDocument/2006/relationships" xmlns:p="http://schemas.openxmlformats.org/presentationml/2006/main">
-  <p:cSld>
-    <p:spTree>
-      <p:nvGrpSpPr>
-        <p:cNvPr id="1" name="Shape 95"/>
-        <p:cNvGrpSpPr/>
-        <p:nvPr/>
-      </p:nvGrpSpPr>
-      <p:grpSpPr>
-        <a:xfrm>
-          <a:off x="0" y="0"/>
-          <a:ext cx="0" cy="0"/>
-          <a:chOff x="0" y="0"/>
-          <a:chExt cx="0" cy="0"/>
-        </a:xfrm>
-      </p:grpSpPr>
-      <p:sp>
-        <p:nvSpPr>
-          <p:cNvPr id="96" name="Google Shape;96;p15"/>
-          <p:cNvSpPr txBox="1">
-            <a:spLocks noGrp="1"/>
-          </p:cNvSpPr>
-          <p:nvPr>
-            <p:ph type="title"/>
-          </p:nvPr>
-        </p:nvSpPr>
-        <p:spPr>
-          <a:xfrm>
-            <a:off x="838200" y="500062"/>
-            <a:ext cx="10515600" cy="1325563"/>
-          </a:xfrm>
-          <a:prstGeom prst="rect">
-            <a:avLst/>
-          </a:prstGeom>
-          <a:noFill/>
-          <a:ln>
-            <a:noFill/>
-          </a:ln>
-        </p:spPr>
-        <p:txBody>
-          <a:bodyPr spcFirstLastPara="1" wrap="square" lIns="91425" tIns="45700" rIns="91425" bIns="45700" anchor="ctr" anchorCtr="0">
-            <a:noAutofit/>
-          </a:bodyPr>
-          <a:lstStyle/>
-          <a:p>
-            <a:pPr marL="0" lvl="0" indent="0" algn="l" rtl="0">
-              <a:lnSpc>
-                <a:spcPct val="90000"/>
-              </a:lnSpc>
-              <a:spcBef>
-                <a:spcPts val="0"/>
-              </a:spcBef>
-              <a:spcAft>
-                <a:spcPts val="0"/>
-              </a:spcAft>
-              <a:buClr>
-                <a:schemeClr val="dk1"/>
-              </a:buClr>
-              <a:buSzPts val="4400"/>
-              <a:buFont typeface="Calibri"/>
-              <a:buNone/>
-            </a:pPr>
-            <a:r>
-              <a:rPr lang="de-AT" dirty="0" smtClean="0">
-                <a:solidFill>
-                  <a:schemeClr val="accent1">
-                    <a:lumMod val="50000"/>
-                  </a:schemeClr>
-                </a:solidFill>
-              </a:rPr>
-              <a:t>Screenshots</a:t>
-            </a:r>
-            <a:endParaRPr dirty="0">
-              <a:solidFill>
-                <a:schemeClr val="accent1">
-                  <a:lumMod val="50000"/>
-                </a:schemeClr>
-              </a:solidFill>
-            </a:endParaRPr>
-          </a:p>
-        </p:txBody>
-      </p:sp>
-      <p:sp>
-        <p:nvSpPr>
-          <p:cNvPr id="97" name="Google Shape;97;p15"/>
-          <p:cNvSpPr txBox="1">
-            <a:spLocks noGrp="1"/>
-          </p:cNvSpPr>
-          <p:nvPr>
-            <p:ph type="body" idx="1"/>
-          </p:nvPr>
-        </p:nvSpPr>
-        <p:spPr>
-          <a:xfrm>
-            <a:off x="838200" y="1825625"/>
-            <a:ext cx="10515600" cy="4351338"/>
-          </a:xfrm>
-          <a:prstGeom prst="rect">
-            <a:avLst/>
-          </a:prstGeom>
-          <a:noFill/>
-          <a:ln>
-            <a:noFill/>
-          </a:ln>
-        </p:spPr>
-        <p:txBody>
-          <a:bodyPr spcFirstLastPara="1" wrap="square" lIns="91425" tIns="45700" rIns="91425" bIns="45700" anchor="t" anchorCtr="0">
-            <a:noAutofit/>
-          </a:bodyPr>
-          <a:lstStyle/>
-          <a:p>
-            <a:pPr marL="0" lvl="0" indent="0" algn="l" rtl="0">
-              <a:spcBef>
-                <a:spcPts val="1000"/>
-              </a:spcBef>
-              <a:spcAft>
-                <a:spcPts val="0"/>
-              </a:spcAft>
-              <a:buNone/>
-            </a:pPr>
-            <a:endParaRPr dirty="0"/>
-          </a:p>
-          <a:p>
-            <a:pPr marL="0" lvl="0" indent="0" algn="l" rtl="0">
-              <a:spcBef>
-                <a:spcPts val="1000"/>
-              </a:spcBef>
-              <a:spcAft>
-                <a:spcPts val="0"/>
-              </a:spcAft>
-              <a:buClr>
-                <a:schemeClr val="dk1"/>
-              </a:buClr>
-              <a:buSzPts val="2800"/>
-              <a:buNone/>
-            </a:pPr>
-            <a:endParaRPr dirty="0"/>
-          </a:p>
-        </p:txBody>
-      </p:sp>
-    </p:spTree>
-    <p:extLst>
-      <p:ext uri="{BB962C8B-B14F-4D97-AF65-F5344CB8AC3E}">
-        <p14:creationId xmlns:p14="http://schemas.microsoft.com/office/powerpoint/2010/main" val="837800657"/>
-      </p:ext>
-    </p:extLst>
-  </p:cSld>
-  <p:clrMapOvr>
-    <a:masterClrMapping/>
-  </p:clrMapOvr>
-  <p:timing>
-    <p:tnLst>
-      <p:par>
-        <p:cTn id="1" dur="indefinite" restart="never" nodeType="tmRoot"/>
-      </p:par>
-    </p:tnLst>
-  </p:timing>
-</p:sld>
-</file>
-
 <file path=ppt/slides/slide2.xml><?xml version="1.0" encoding="utf-8"?>
 <p:sld xmlns:a="http://schemas.openxmlformats.org/drawingml/2006/main" xmlns:r="http://schemas.openxmlformats.org/officeDocument/2006/relationships" xmlns:p="http://schemas.openxmlformats.org/presentationml/2006/main">
   <p:cSld>

</xml_diff>